<commit_message>
Updated the slide deck to have the new github ref.
</commit_message>
<xml_diff>
--- a/slides/aspconnections_2010_AMV204.pptx
+++ b/slides/aspconnections_2010_AMV204.pptx
@@ -12426,13 +12426,8 @@
           <a:p>
             <a:r>
               <a:rPr lang="en-US" sz="2400" dirty="0" smtClean="0"/>
-              <a:t>Blog:     http://</a:t>
-            </a:r>
-            <a:r>
-              <a:rPr lang="en-US" sz="2400" dirty="0" smtClean="0"/>
-              <a:t>lozanotek.com/blog</a:t>
-            </a:r>
-            <a:endParaRPr lang="en-US" sz="2400" dirty="0" smtClean="0"/>
+              <a:t>Blog:     http://lozanotek.com/blog</a:t>
+            </a:r>
           </a:p>
           <a:p>
             <a:r>
@@ -12443,8 +12438,17 @@
           <a:p>
             <a:r>
               <a:rPr lang="en-US" sz="2400" dirty="0" smtClean="0"/>
-              <a:t>Code:   http://github.com/jglozano/zenofmvc</a:t>
-            </a:r>
+              <a:t>Code:   http</a:t>
+            </a:r>
+            <a:r>
+              <a:rPr lang="en-US" sz="2400" smtClean="0"/>
+              <a:t>://</a:t>
+            </a:r>
+            <a:r>
+              <a:rPr lang="en-US" sz="2400" smtClean="0"/>
+              <a:t>github.com/lozanotek/zenofmvc</a:t>
+            </a:r>
+            <a:endParaRPr lang="en-US" sz="2400" dirty="0" smtClean="0"/>
           </a:p>
         </p:txBody>
       </p:sp>

</xml_diff>